<commit_message>
feat 0213: pytrend 수집기능 3개로 증가
</commit_message>
<xml_diff>
--- a/DIAGRAM.pptx
+++ b/DIAGRAM.pptx
@@ -104,6 +104,11 @@
       </a:defRPr>
     </a:lvl9pPr>
   </p:defaultTextStyle>
+  <p:extLst>
+    <p:ext uri="{EFAFB233-063F-42B5-8137-9DF3F51BA10A}">
+      <p15:sldGuideLst xmlns:p15="http://schemas.microsoft.com/office/powerpoint/2012/main"/>
+    </p:ext>
+  </p:extLst>
 </p:presentation>
 </file>
 
@@ -459,7 +464,7 @@
           <a:p>
             <a:fld id="{DFC77CD5-432B-4989-8FA2-B74BD754E944}" type="datetimeFigureOut">
               <a:rPr lang="ko-KR" altLang="en-US" smtClean="0"/>
-              <a:t>2023-02-10</a:t>
+              <a:t>2023-02-13</a:t>
             </a:fld>
             <a:endParaRPr lang="ko-KR" altLang="en-US"/>
           </a:p>
@@ -657,7 +662,7 @@
           <a:p>
             <a:fld id="{DFC77CD5-432B-4989-8FA2-B74BD754E944}" type="datetimeFigureOut">
               <a:rPr lang="ko-KR" altLang="en-US" smtClean="0"/>
-              <a:t>2023-02-10</a:t>
+              <a:t>2023-02-13</a:t>
             </a:fld>
             <a:endParaRPr lang="ko-KR" altLang="en-US"/>
           </a:p>
@@ -865,7 +870,7 @@
           <a:p>
             <a:fld id="{DFC77CD5-432B-4989-8FA2-B74BD754E944}" type="datetimeFigureOut">
               <a:rPr lang="ko-KR" altLang="en-US" smtClean="0"/>
-              <a:t>2023-02-10</a:t>
+              <a:t>2023-02-13</a:t>
             </a:fld>
             <a:endParaRPr lang="ko-KR" altLang="en-US"/>
           </a:p>
@@ -1063,7 +1068,7 @@
           <a:p>
             <a:fld id="{DFC77CD5-432B-4989-8FA2-B74BD754E944}" type="datetimeFigureOut">
               <a:rPr lang="ko-KR" altLang="en-US" smtClean="0"/>
-              <a:t>2023-02-10</a:t>
+              <a:t>2023-02-13</a:t>
             </a:fld>
             <a:endParaRPr lang="ko-KR" altLang="en-US"/>
           </a:p>
@@ -1338,7 +1343,7 @@
           <a:p>
             <a:fld id="{DFC77CD5-432B-4989-8FA2-B74BD754E944}" type="datetimeFigureOut">
               <a:rPr lang="ko-KR" altLang="en-US" smtClean="0"/>
-              <a:t>2023-02-10</a:t>
+              <a:t>2023-02-13</a:t>
             </a:fld>
             <a:endParaRPr lang="ko-KR" altLang="en-US"/>
           </a:p>
@@ -1603,7 +1608,7 @@
           <a:p>
             <a:fld id="{DFC77CD5-432B-4989-8FA2-B74BD754E944}" type="datetimeFigureOut">
               <a:rPr lang="ko-KR" altLang="en-US" smtClean="0"/>
-              <a:t>2023-02-10</a:t>
+              <a:t>2023-02-13</a:t>
             </a:fld>
             <a:endParaRPr lang="ko-KR" altLang="en-US"/>
           </a:p>
@@ -2015,7 +2020,7 @@
           <a:p>
             <a:fld id="{DFC77CD5-432B-4989-8FA2-B74BD754E944}" type="datetimeFigureOut">
               <a:rPr lang="ko-KR" altLang="en-US" smtClean="0"/>
-              <a:t>2023-02-10</a:t>
+              <a:t>2023-02-13</a:t>
             </a:fld>
             <a:endParaRPr lang="ko-KR" altLang="en-US"/>
           </a:p>
@@ -2156,7 +2161,7 @@
           <a:p>
             <a:fld id="{DFC77CD5-432B-4989-8FA2-B74BD754E944}" type="datetimeFigureOut">
               <a:rPr lang="ko-KR" altLang="en-US" smtClean="0"/>
-              <a:t>2023-02-10</a:t>
+              <a:t>2023-02-13</a:t>
             </a:fld>
             <a:endParaRPr lang="ko-KR" altLang="en-US"/>
           </a:p>
@@ -2269,7 +2274,7 @@
           <a:p>
             <a:fld id="{DFC77CD5-432B-4989-8FA2-B74BD754E944}" type="datetimeFigureOut">
               <a:rPr lang="ko-KR" altLang="en-US" smtClean="0"/>
-              <a:t>2023-02-10</a:t>
+              <a:t>2023-02-13</a:t>
             </a:fld>
             <a:endParaRPr lang="ko-KR" altLang="en-US"/>
           </a:p>
@@ -2580,7 +2585,7 @@
           <a:p>
             <a:fld id="{DFC77CD5-432B-4989-8FA2-B74BD754E944}" type="datetimeFigureOut">
               <a:rPr lang="ko-KR" altLang="en-US" smtClean="0"/>
-              <a:t>2023-02-10</a:t>
+              <a:t>2023-02-13</a:t>
             </a:fld>
             <a:endParaRPr lang="ko-KR" altLang="en-US"/>
           </a:p>
@@ -2868,7 +2873,7 @@
           <a:p>
             <a:fld id="{DFC77CD5-432B-4989-8FA2-B74BD754E944}" type="datetimeFigureOut">
               <a:rPr lang="ko-KR" altLang="en-US" smtClean="0"/>
-              <a:t>2023-02-10</a:t>
+              <a:t>2023-02-13</a:t>
             </a:fld>
             <a:endParaRPr lang="ko-KR" altLang="en-US"/>
           </a:p>
@@ -3109,7 +3114,7 @@
           <a:p>
             <a:fld id="{DFC77CD5-432B-4989-8FA2-B74BD754E944}" type="datetimeFigureOut">
               <a:rPr lang="ko-KR" altLang="en-US" smtClean="0"/>
-              <a:t>2023-02-10</a:t>
+              <a:t>2023-02-13</a:t>
             </a:fld>
             <a:endParaRPr lang="ko-KR" altLang="en-US"/>
           </a:p>
@@ -3555,8 +3560,8 @@
         </p:blipFill>
         <p:spPr bwMode="auto">
           <a:xfrm>
-            <a:off x="370142" y="1969213"/>
-            <a:ext cx="1715135" cy="1715135"/>
+            <a:off x="407775" y="612874"/>
+            <a:ext cx="857568" cy="857568"/>
           </a:xfrm>
           <a:prstGeom prst="rect">
             <a:avLst/>
@@ -3602,8 +3607,8 @@
         </p:blipFill>
         <p:spPr bwMode="auto">
           <a:xfrm>
-            <a:off x="2044582" y="1584910"/>
-            <a:ext cx="4413744" cy="2483739"/>
+            <a:off x="2170400" y="1613450"/>
+            <a:ext cx="2708094" cy="1523921"/>
           </a:xfrm>
           <a:prstGeom prst="rect">
             <a:avLst/>
@@ -3649,8 +3654,8 @@
         </p:blipFill>
         <p:spPr bwMode="auto">
           <a:xfrm>
-            <a:off x="5783193" y="1869420"/>
-            <a:ext cx="3428390" cy="2142744"/>
+            <a:off x="5213251" y="1635682"/>
+            <a:ext cx="2263420" cy="1414638"/>
           </a:xfrm>
           <a:prstGeom prst="rect">
             <a:avLst/>
@@ -3667,143 +3672,6 @@
           </a:extLst>
         </p:spPr>
       </p:pic>
-      <p:pic>
-        <p:nvPicPr>
-          <p:cNvPr id="1036" name="Picture 12" descr="웹 페이지 - 무료 상호 작용개 아이콘">
-            <a:extLst>
-              <a:ext uri="{FF2B5EF4-FFF2-40B4-BE49-F238E27FC236}">
-                <a16:creationId xmlns:a16="http://schemas.microsoft.com/office/drawing/2014/main" id="{7262071A-1F16-57E0-7D53-2151516ADD0B}"/>
-              </a:ext>
-            </a:extLst>
-          </p:cNvPr>
-          <p:cNvPicPr>
-            <a:picLocks noChangeAspect="1" noChangeArrowheads="1"/>
-          </p:cNvPicPr>
-          <p:nvPr/>
-        </p:nvPicPr>
-        <p:blipFill>
-          <a:blip r:embed="rId5">
-            <a:extLst>
-              <a:ext uri="{28A0092B-C50C-407E-A947-70E740481C1C}">
-                <a14:useLocalDpi xmlns:a14="http://schemas.microsoft.com/office/drawing/2010/main" val="0"/>
-              </a:ext>
-            </a:extLst>
-          </a:blip>
-          <a:srcRect/>
-          <a:stretch>
-            <a:fillRect/>
-          </a:stretch>
-        </p:blipFill>
-        <p:spPr bwMode="auto">
-          <a:xfrm>
-            <a:off x="9525575" y="1651520"/>
-            <a:ext cx="2296283" cy="2360644"/>
-          </a:xfrm>
-          <a:prstGeom prst="rect">
-            <a:avLst/>
-          </a:prstGeom>
-          <a:noFill/>
-          <a:extLst>
-            <a:ext uri="{909E8E84-426E-40DD-AFC4-6F175D3DCCD1}">
-              <a14:hiddenFill xmlns:a14="http://schemas.microsoft.com/office/drawing/2010/main">
-                <a:solidFill>
-                  <a:srgbClr val="FFFFFF"/>
-                </a:solidFill>
-              </a14:hiddenFill>
-            </a:ext>
-          </a:extLst>
-        </p:spPr>
-      </p:pic>
-      <p:pic>
-        <p:nvPicPr>
-          <p:cNvPr id="1038" name="Picture 14" descr="2020 올해의 검색어 - 국내 종합">
-            <a:extLst>
-              <a:ext uri="{FF2B5EF4-FFF2-40B4-BE49-F238E27FC236}">
-                <a16:creationId xmlns:a16="http://schemas.microsoft.com/office/drawing/2014/main" id="{A1C74452-3E65-A111-2D96-6F2CF80FAB52}"/>
-              </a:ext>
-            </a:extLst>
-          </p:cNvPr>
-          <p:cNvPicPr>
-            <a:picLocks noChangeAspect="1" noChangeArrowheads="1"/>
-          </p:cNvPicPr>
-          <p:nvPr/>
-        </p:nvPicPr>
-        <p:blipFill rotWithShape="1">
-          <a:blip r:embed="rId6">
-            <a:extLst>
-              <a:ext uri="{28A0092B-C50C-407E-A947-70E740481C1C}">
-                <a14:useLocalDpi xmlns:a14="http://schemas.microsoft.com/office/drawing/2010/main" val="0"/>
-              </a:ext>
-            </a:extLst>
-          </a:blip>
-          <a:srcRect t="27337" b="43984"/>
-          <a:stretch/>
-        </p:blipFill>
-        <p:spPr bwMode="auto">
-          <a:xfrm>
-            <a:off x="9770689" y="2826781"/>
-            <a:ext cx="1815414" cy="968925"/>
-          </a:xfrm>
-          <a:prstGeom prst="rect">
-            <a:avLst/>
-          </a:prstGeom>
-          <a:noFill/>
-          <a:extLst>
-            <a:ext uri="{909E8E84-426E-40DD-AFC4-6F175D3DCCD1}">
-              <a14:hiddenFill xmlns:a14="http://schemas.microsoft.com/office/drawing/2010/main">
-                <a:solidFill>
-                  <a:srgbClr val="FFFFFF"/>
-                </a:solidFill>
-              </a14:hiddenFill>
-            </a:ext>
-          </a:extLst>
-        </p:spPr>
-      </p:pic>
-      <p:pic>
-        <p:nvPicPr>
-          <p:cNvPr id="4" name="Picture 14" descr="2020 올해의 검색어 - 국내 종합">
-            <a:extLst>
-              <a:ext uri="{FF2B5EF4-FFF2-40B4-BE49-F238E27FC236}">
-                <a16:creationId xmlns:a16="http://schemas.microsoft.com/office/drawing/2014/main" id="{04D0E9AB-15D2-27AA-9373-F7484D128F97}"/>
-              </a:ext>
-            </a:extLst>
-          </p:cNvPr>
-          <p:cNvPicPr>
-            <a:picLocks noChangeAspect="1" noChangeArrowheads="1"/>
-          </p:cNvPicPr>
-          <p:nvPr/>
-        </p:nvPicPr>
-        <p:blipFill rotWithShape="1">
-          <a:blip r:embed="rId6">
-            <a:extLst>
-              <a:ext uri="{28A0092B-C50C-407E-A947-70E740481C1C}">
-                <a14:useLocalDpi xmlns:a14="http://schemas.microsoft.com/office/drawing/2010/main" val="0"/>
-              </a:ext>
-            </a:extLst>
-          </a:blip>
-          <a:srcRect l="514" t="4366" r="-514" b="82102"/>
-          <a:stretch/>
-        </p:blipFill>
-        <p:spPr bwMode="auto">
-          <a:xfrm>
-            <a:off x="9770689" y="2369580"/>
-            <a:ext cx="1815414" cy="457201"/>
-          </a:xfrm>
-          <a:prstGeom prst="rect">
-            <a:avLst/>
-          </a:prstGeom>
-          <a:noFill/>
-          <a:extLst>
-            <a:ext uri="{909E8E84-426E-40DD-AFC4-6F175D3DCCD1}">
-              <a14:hiddenFill xmlns:a14="http://schemas.microsoft.com/office/drawing/2010/main">
-                <a:solidFill>
-                  <a:srgbClr val="FFFFFF"/>
-                </a:solidFill>
-              </a14:hiddenFill>
-            </a:ext>
-          </a:extLst>
-        </p:spPr>
-      </p:pic>
       <p:sp>
         <p:nvSpPr>
           <p:cNvPr id="5" name="화살표: 오른쪽 4">
@@ -3818,8 +3686,8 @@
         </p:nvSpPr>
         <p:spPr>
           <a:xfrm>
-            <a:off x="2200808" y="2756314"/>
-            <a:ext cx="829128" cy="368955"/>
+            <a:off x="1492909" y="2138028"/>
+            <a:ext cx="899957" cy="368955"/>
           </a:xfrm>
           <a:prstGeom prst="rightArrow">
             <a:avLst>
@@ -3828,12 +3696,9 @@
             </a:avLst>
           </a:prstGeom>
           <a:solidFill>
-            <a:schemeClr val="accent4">
-              <a:lumMod val="60000"/>
-              <a:lumOff val="40000"/>
-            </a:schemeClr>
+            <a:schemeClr val="accent6"/>
           </a:solidFill>
-          <a:ln w="38100">
+          <a:ln w="19050">
             <a:solidFill>
               <a:schemeClr val="tx1"/>
             </a:solidFill>
@@ -3887,7 +3752,7 @@
         </p:nvSpPr>
         <p:spPr>
           <a:xfrm>
-            <a:off x="5371630" y="2756314"/>
+            <a:off x="4509677" y="2115163"/>
             <a:ext cx="829128" cy="368955"/>
           </a:xfrm>
           <a:prstGeom prst="rightArrow">
@@ -3902,7 +3767,7 @@
               <a:lumOff val="40000"/>
             </a:schemeClr>
           </a:solidFill>
-          <a:ln w="38100">
+          <a:ln w="19050">
             <a:solidFill>
               <a:schemeClr val="tx1"/>
             </a:solidFill>
@@ -3956,7 +3821,7 @@
         </p:nvSpPr>
         <p:spPr>
           <a:xfrm>
-            <a:off x="8627569" y="2756313"/>
+            <a:off x="7487067" y="2115162"/>
             <a:ext cx="829128" cy="368955"/>
           </a:xfrm>
           <a:prstGeom prst="rightArrow">
@@ -3966,12 +3831,11 @@
             </a:avLst>
           </a:prstGeom>
           <a:solidFill>
-            <a:schemeClr val="accent4">
-              <a:lumMod val="60000"/>
-              <a:lumOff val="40000"/>
+            <a:schemeClr val="accent5">
+              <a:lumMod val="75000"/>
             </a:schemeClr>
           </a:solidFill>
-          <a:ln w="38100">
+          <a:ln w="19050">
             <a:solidFill>
               <a:schemeClr val="tx1"/>
             </a:solidFill>
@@ -4025,8 +3889,8 @@
         </p:nvSpPr>
         <p:spPr>
           <a:xfrm>
-            <a:off x="431442" y="4232561"/>
-            <a:ext cx="1885038" cy="307777"/>
+            <a:off x="266002" y="4583132"/>
+            <a:ext cx="1331638" cy="261610"/>
           </a:xfrm>
           <a:prstGeom prst="rect">
             <a:avLst/>
@@ -4064,7 +3928,7 @@
           <a:p>
             <a:pPr algn="ctr"/>
             <a:r>
-              <a:rPr lang="en-US" altLang="ko-KR" sz="1400" b="1">
+              <a:rPr lang="en-US" altLang="ko-KR" sz="1050" b="1">
                 <a:ln w="3175">
                   <a:solidFill>
                     <a:schemeClr val="bg2">
@@ -4074,15 +3938,18 @@
                   <a:prstDash val="solid"/>
                 </a:ln>
                 <a:solidFill>
-                  <a:schemeClr val="tx1"/>
+                  <a:schemeClr val="tx1">
+                    <a:lumMod val="95000"/>
+                    <a:lumOff val="5000"/>
+                  </a:schemeClr>
                 </a:solidFill>
                 <a:latin typeface="Footlight MT Light" panose="0204060206030A020304" pitchFamily="18" charset="0"/>
                 <a:ea typeface="DengXian" panose="020B0503020204020204" pitchFamily="2" charset="-122"/>
                 <a:cs typeface="David" panose="020B0604020202020204" pitchFamily="34" charset="-79"/>
               </a:rPr>
-              <a:t>keyword_data.csv</a:t>
-            </a:r>
-            <a:endParaRPr lang="ko-KR" altLang="en-US" sz="1400" b="1">
+              <a:t>keyword_data1.csv</a:t>
+            </a:r>
+            <a:endParaRPr lang="ko-KR" altLang="en-US" sz="1050" b="1">
               <a:ln w="3175">
                 <a:solidFill>
                   <a:schemeClr val="bg2">
@@ -4092,7 +3959,10 @@
                 <a:prstDash val="solid"/>
               </a:ln>
               <a:solidFill>
-                <a:schemeClr val="tx1"/>
+                <a:schemeClr val="tx1">
+                  <a:lumMod val="95000"/>
+                  <a:lumOff val="5000"/>
+                </a:schemeClr>
               </a:solidFill>
               <a:latin typeface="Footlight MT Light" panose="0204060206030A020304" pitchFamily="18" charset="0"/>
               <a:cs typeface="David" panose="020B0604020202020204" pitchFamily="34" charset="-79"/>
@@ -4114,8 +3984,8 @@
         </p:nvSpPr>
         <p:spPr>
           <a:xfrm>
-            <a:off x="3159402" y="4232560"/>
-            <a:ext cx="1885038" cy="307777"/>
+            <a:off x="2675323" y="5185049"/>
+            <a:ext cx="1834354" cy="307777"/>
           </a:xfrm>
           <a:prstGeom prst="rect">
             <a:avLst/>
@@ -4163,7 +4033,10 @@
                   <a:prstDash val="solid"/>
                 </a:ln>
                 <a:solidFill>
-                  <a:schemeClr val="tx1"/>
+                  <a:schemeClr val="tx1">
+                    <a:lumMod val="95000"/>
+                    <a:lumOff val="5000"/>
+                  </a:schemeClr>
                 </a:solidFill>
                 <a:latin typeface="Footlight MT Light" panose="0204060206030A020304" pitchFamily="18" charset="0"/>
                 <a:ea typeface="DengXian" panose="020B0503020204020204" pitchFamily="2" charset="-122"/>
@@ -4181,7 +4054,10 @@
                 <a:prstDash val="solid"/>
               </a:ln>
               <a:solidFill>
-                <a:schemeClr val="tx1"/>
+                <a:schemeClr val="tx1">
+                  <a:lumMod val="95000"/>
+                  <a:lumOff val="5000"/>
+                </a:schemeClr>
               </a:solidFill>
               <a:latin typeface="Footlight MT Light" panose="0204060206030A020304" pitchFamily="18" charset="0"/>
               <a:cs typeface="David" panose="020B0604020202020204" pitchFamily="34" charset="-79"/>
@@ -4203,8 +4079,8 @@
         </p:nvSpPr>
         <p:spPr>
           <a:xfrm>
-            <a:off x="6649362" y="4232560"/>
-            <a:ext cx="1885038" cy="307777"/>
+            <a:off x="5338805" y="5185049"/>
+            <a:ext cx="2148262" cy="307777"/>
           </a:xfrm>
           <a:prstGeom prst="rect">
             <a:avLst/>
@@ -4252,7 +4128,10 @@
                   <a:prstDash val="solid"/>
                 </a:ln>
                 <a:solidFill>
-                  <a:schemeClr val="tx1"/>
+                  <a:schemeClr val="tx1">
+                    <a:lumMod val="95000"/>
+                    <a:lumOff val="5000"/>
+                  </a:schemeClr>
                 </a:solidFill>
                 <a:latin typeface="Footlight MT Light" panose="0204060206030A020304" pitchFamily="18" charset="0"/>
                 <a:ea typeface="DengXian" panose="020B0503020204020204" pitchFamily="2" charset="-122"/>
@@ -4270,7 +4149,10 @@
                 <a:prstDash val="solid"/>
               </a:ln>
               <a:solidFill>
-                <a:schemeClr val="tx1"/>
+                <a:schemeClr val="tx1">
+                  <a:lumMod val="95000"/>
+                  <a:lumOff val="5000"/>
+                </a:schemeClr>
               </a:solidFill>
               <a:latin typeface="Footlight MT Light" panose="0204060206030A020304" pitchFamily="18" charset="0"/>
               <a:cs typeface="David" panose="020B0604020202020204" pitchFamily="34" charset="-79"/>
@@ -4290,22 +4172,21 @@
           <p:cNvCxnSpPr>
             <a:cxnSpLocks/>
             <a:stCxn id="11" idx="3"/>
+            <a:endCxn id="51" idx="1"/>
           </p:cNvCxnSpPr>
           <p:nvPr/>
         </p:nvCxnSpPr>
         <p:spPr>
           <a:xfrm>
-            <a:off x="8534400" y="4386449"/>
-            <a:ext cx="2042160" cy="0"/>
+            <a:off x="7487067" y="5338938"/>
+            <a:ext cx="1020700" cy="0"/>
           </a:xfrm>
           <a:prstGeom prst="straightConnector1">
             <a:avLst/>
           </a:prstGeom>
-          <a:ln>
+          <a:ln w="57150">
             <a:solidFill>
-              <a:schemeClr val="accent3">
-                <a:lumMod val="75000"/>
-              </a:schemeClr>
+              <a:schemeClr val="accent5"/>
             </a:solidFill>
             <a:tailEnd type="triangle"/>
           </a:ln>
@@ -4343,17 +4224,15 @@
         </p:nvCxnSpPr>
         <p:spPr>
           <a:xfrm>
-            <a:off x="5044440" y="4386449"/>
-            <a:ext cx="1604922" cy="0"/>
+            <a:off x="4509677" y="5338938"/>
+            <a:ext cx="829128" cy="0"/>
           </a:xfrm>
           <a:prstGeom prst="straightConnector1">
             <a:avLst/>
           </a:prstGeom>
-          <a:ln>
+          <a:ln w="57150">
             <a:solidFill>
-              <a:schemeClr val="accent3">
-                <a:lumMod val="75000"/>
-              </a:schemeClr>
+              <a:schemeClr val="accent4"/>
             </a:solidFill>
             <a:tailEnd type="triangle"/>
           </a:ln>
@@ -4390,20 +4269,19 @@
           <p:nvPr/>
         </p:nvCxnSpPr>
         <p:spPr>
-          <a:xfrm flipV="1">
-            <a:off x="2316480" y="4386449"/>
-            <a:ext cx="842922" cy="1"/>
+          <a:xfrm>
+            <a:off x="1597640" y="4713937"/>
+            <a:ext cx="1077683" cy="625001"/>
           </a:xfrm>
           <a:prstGeom prst="straightConnector1">
             <a:avLst/>
           </a:prstGeom>
-          <a:ln>
+          <a:ln w="57150">
             <a:solidFill>
-              <a:schemeClr val="accent3">
-                <a:lumMod val="75000"/>
-              </a:schemeClr>
+              <a:schemeClr val="accent6"/>
             </a:solidFill>
-            <a:tailEnd type="triangle"/>
+            <a:headEnd type="none" w="med" len="med"/>
+            <a:tailEnd type="none" w="med" len="med"/>
           </a:ln>
         </p:spPr>
         <p:style>
@@ -4421,6 +4299,766 @@
           </a:fontRef>
         </p:style>
       </p:cxnSp>
+      <p:pic>
+        <p:nvPicPr>
+          <p:cNvPr id="17" name="Picture 2" descr="Csv - 무료 상호 작용개 아이콘">
+            <a:extLst>
+              <a:ext uri="{FF2B5EF4-FFF2-40B4-BE49-F238E27FC236}">
+                <a16:creationId xmlns:a16="http://schemas.microsoft.com/office/drawing/2014/main" id="{9455D805-226C-4908-8E12-5D36AD6A2DFF}"/>
+              </a:ext>
+            </a:extLst>
+          </p:cNvPr>
+          <p:cNvPicPr>
+            <a:picLocks noChangeAspect="1" noChangeArrowheads="1"/>
+          </p:cNvPicPr>
+          <p:nvPr/>
+        </p:nvPicPr>
+        <p:blipFill>
+          <a:blip r:embed="rId2">
+            <a:extLst>
+              <a:ext uri="{28A0092B-C50C-407E-A947-70E740481C1C}">
+                <a14:useLocalDpi xmlns:a14="http://schemas.microsoft.com/office/drawing/2010/main" val="0"/>
+              </a:ext>
+            </a:extLst>
+          </a:blip>
+          <a:srcRect/>
+          <a:stretch>
+            <a:fillRect/>
+          </a:stretch>
+        </p:blipFill>
+        <p:spPr bwMode="auto">
+          <a:xfrm>
+            <a:off x="407775" y="1846084"/>
+            <a:ext cx="857568" cy="857568"/>
+          </a:xfrm>
+          <a:prstGeom prst="rect">
+            <a:avLst/>
+          </a:prstGeom>
+          <a:noFill/>
+          <a:extLst>
+            <a:ext uri="{909E8E84-426E-40DD-AFC4-6F175D3DCCD1}">
+              <a14:hiddenFill xmlns:a14="http://schemas.microsoft.com/office/drawing/2010/main">
+                <a:solidFill>
+                  <a:srgbClr val="FFFFFF"/>
+                </a:solidFill>
+              </a14:hiddenFill>
+            </a:ext>
+          </a:extLst>
+        </p:spPr>
+      </p:pic>
+      <p:pic>
+        <p:nvPicPr>
+          <p:cNvPr id="18" name="Picture 2" descr="Csv - 무료 상호 작용개 아이콘">
+            <a:extLst>
+              <a:ext uri="{FF2B5EF4-FFF2-40B4-BE49-F238E27FC236}">
+                <a16:creationId xmlns:a16="http://schemas.microsoft.com/office/drawing/2014/main" id="{DDD40CFE-0072-4F88-92E3-93511054A3FD}"/>
+              </a:ext>
+            </a:extLst>
+          </p:cNvPr>
+          <p:cNvPicPr>
+            <a:picLocks noChangeAspect="1" noChangeArrowheads="1"/>
+          </p:cNvPicPr>
+          <p:nvPr/>
+        </p:nvPicPr>
+        <p:blipFill>
+          <a:blip r:embed="rId2">
+            <a:extLst>
+              <a:ext uri="{28A0092B-C50C-407E-A947-70E740481C1C}">
+                <a14:useLocalDpi xmlns:a14="http://schemas.microsoft.com/office/drawing/2010/main" val="0"/>
+              </a:ext>
+            </a:extLst>
+          </a:blip>
+          <a:srcRect/>
+          <a:stretch>
+            <a:fillRect/>
+          </a:stretch>
+        </p:blipFill>
+        <p:spPr bwMode="auto">
+          <a:xfrm>
+            <a:off x="407775" y="3079294"/>
+            <a:ext cx="857568" cy="857568"/>
+          </a:xfrm>
+          <a:prstGeom prst="rect">
+            <a:avLst/>
+          </a:prstGeom>
+          <a:noFill/>
+          <a:extLst>
+            <a:ext uri="{909E8E84-426E-40DD-AFC4-6F175D3DCCD1}">
+              <a14:hiddenFill xmlns:a14="http://schemas.microsoft.com/office/drawing/2010/main">
+                <a:solidFill>
+                  <a:srgbClr val="FFFFFF"/>
+                </a:solidFill>
+              </a14:hiddenFill>
+            </a:ext>
+          </a:extLst>
+        </p:spPr>
+      </p:pic>
+      <p:sp>
+        <p:nvSpPr>
+          <p:cNvPr id="21" name="화살표: 오른쪽 20">
+            <a:extLst>
+              <a:ext uri="{FF2B5EF4-FFF2-40B4-BE49-F238E27FC236}">
+                <a16:creationId xmlns:a16="http://schemas.microsoft.com/office/drawing/2014/main" id="{B879326C-8AB2-43DD-B516-1AC08208A1BC}"/>
+              </a:ext>
+            </a:extLst>
+          </p:cNvPr>
+          <p:cNvSpPr/>
+          <p:nvPr/>
+        </p:nvSpPr>
+        <p:spPr>
+          <a:xfrm rot="1722458">
+            <a:off x="1485316" y="1311419"/>
+            <a:ext cx="979695" cy="368955"/>
+          </a:xfrm>
+          <a:prstGeom prst="rightArrow">
+            <a:avLst>
+              <a:gd name="adj1" fmla="val 34597"/>
+              <a:gd name="adj2" fmla="val 63477"/>
+            </a:avLst>
+          </a:prstGeom>
+          <a:solidFill>
+            <a:schemeClr val="accent6"/>
+          </a:solidFill>
+          <a:ln w="19050">
+            <a:solidFill>
+              <a:schemeClr val="tx1"/>
+            </a:solidFill>
+          </a:ln>
+        </p:spPr>
+        <p:style>
+          <a:lnRef idx="2">
+            <a:schemeClr val="accent1">
+              <a:shade val="50000"/>
+            </a:schemeClr>
+          </a:lnRef>
+          <a:fillRef idx="1">
+            <a:schemeClr val="accent1"/>
+          </a:fillRef>
+          <a:effectRef idx="0">
+            <a:schemeClr val="accent1"/>
+          </a:effectRef>
+          <a:fontRef idx="minor">
+            <a:schemeClr val="lt1"/>
+          </a:fontRef>
+        </p:style>
+        <p:txBody>
+          <a:bodyPr rtlCol="0" anchor="ctr"/>
+          <a:lstStyle/>
+          <a:p>
+            <a:pPr algn="ctr"/>
+            <a:endParaRPr lang="ko-KR" altLang="en-US">
+              <a:ln>
+                <a:solidFill>
+                  <a:srgbClr val="FF0000"/>
+                </a:solidFill>
+              </a:ln>
+              <a:solidFill>
+                <a:srgbClr val="FF0000"/>
+              </a:solidFill>
+            </a:endParaRPr>
+          </a:p>
+        </p:txBody>
+      </p:sp>
+      <p:sp>
+        <p:nvSpPr>
+          <p:cNvPr id="22" name="화살표: 오른쪽 21">
+            <a:extLst>
+              <a:ext uri="{FF2B5EF4-FFF2-40B4-BE49-F238E27FC236}">
+                <a16:creationId xmlns:a16="http://schemas.microsoft.com/office/drawing/2014/main" id="{1A80ECCA-5118-4A32-9DE9-BF4694DEDAD3}"/>
+              </a:ext>
+            </a:extLst>
+          </p:cNvPr>
+          <p:cNvSpPr/>
+          <p:nvPr/>
+        </p:nvSpPr>
+        <p:spPr>
+          <a:xfrm rot="19619503">
+            <a:off x="1515181" y="2973993"/>
+            <a:ext cx="969283" cy="368955"/>
+          </a:xfrm>
+          <a:prstGeom prst="rightArrow">
+            <a:avLst>
+              <a:gd name="adj1" fmla="val 34597"/>
+              <a:gd name="adj2" fmla="val 63477"/>
+            </a:avLst>
+          </a:prstGeom>
+          <a:solidFill>
+            <a:schemeClr val="accent6"/>
+          </a:solidFill>
+          <a:ln w="19050">
+            <a:solidFill>
+              <a:schemeClr val="tx1"/>
+            </a:solidFill>
+          </a:ln>
+        </p:spPr>
+        <p:style>
+          <a:lnRef idx="2">
+            <a:schemeClr val="accent1">
+              <a:shade val="50000"/>
+            </a:schemeClr>
+          </a:lnRef>
+          <a:fillRef idx="1">
+            <a:schemeClr val="accent1"/>
+          </a:fillRef>
+          <a:effectRef idx="0">
+            <a:schemeClr val="accent1"/>
+          </a:effectRef>
+          <a:fontRef idx="minor">
+            <a:schemeClr val="lt1"/>
+          </a:fontRef>
+        </p:style>
+        <p:txBody>
+          <a:bodyPr rtlCol="0" anchor="ctr"/>
+          <a:lstStyle/>
+          <a:p>
+            <a:pPr algn="ctr"/>
+            <a:endParaRPr lang="ko-KR" altLang="en-US">
+              <a:ln>
+                <a:solidFill>
+                  <a:srgbClr val="FF0000"/>
+                </a:solidFill>
+              </a:ln>
+              <a:solidFill>
+                <a:srgbClr val="FF0000"/>
+              </a:solidFill>
+            </a:endParaRPr>
+          </a:p>
+        </p:txBody>
+      </p:sp>
+      <p:pic>
+        <p:nvPicPr>
+          <p:cNvPr id="9" name="Picture 4" descr="인터넷 웹 사이트 페이지 벡터 일러스트 그래픽 디자인 로열티 무료 사진, 그림, 이미지 그리고 스톡포토그래피. Image  74941820.">
+            <a:extLst>
+              <a:ext uri="{FF2B5EF4-FFF2-40B4-BE49-F238E27FC236}">
+                <a16:creationId xmlns:a16="http://schemas.microsoft.com/office/drawing/2014/main" id="{FDCFAEA5-41C7-436F-A8D9-3881CD5CAB20}"/>
+              </a:ext>
+            </a:extLst>
+          </p:cNvPr>
+          <p:cNvPicPr>
+            <a:picLocks noChangeAspect="1" noChangeArrowheads="1"/>
+          </p:cNvPicPr>
+          <p:nvPr/>
+        </p:nvPicPr>
+        <p:blipFill rotWithShape="1">
+          <a:blip r:embed="rId5">
+            <a:extLst>
+              <a:ext uri="{28A0092B-C50C-407E-A947-70E740481C1C}">
+                <a14:useLocalDpi xmlns:a14="http://schemas.microsoft.com/office/drawing/2010/main" val="0"/>
+              </a:ext>
+            </a:extLst>
+          </a:blip>
+          <a:srcRect l="20308" t="25415" r="17546" b="25819"/>
+          <a:stretch/>
+        </p:blipFill>
+        <p:spPr bwMode="auto">
+          <a:xfrm>
+            <a:off x="8507767" y="899143"/>
+            <a:ext cx="3533233" cy="2772535"/>
+          </a:xfrm>
+          <a:prstGeom prst="rect">
+            <a:avLst/>
+          </a:prstGeom>
+          <a:noFill/>
+          <a:extLst>
+            <a:ext uri="{909E8E84-426E-40DD-AFC4-6F175D3DCCD1}">
+              <a14:hiddenFill xmlns:a14="http://schemas.microsoft.com/office/drawing/2010/main">
+                <a:solidFill>
+                  <a:srgbClr val="FFFFFF"/>
+                </a:solidFill>
+              </a14:hiddenFill>
+            </a:ext>
+          </a:extLst>
+        </p:spPr>
+      </p:pic>
+      <p:sp>
+        <p:nvSpPr>
+          <p:cNvPr id="28" name="TextBox 27">
+            <a:extLst>
+              <a:ext uri="{FF2B5EF4-FFF2-40B4-BE49-F238E27FC236}">
+                <a16:creationId xmlns:a16="http://schemas.microsoft.com/office/drawing/2014/main" id="{4874F04A-5240-4BA9-A2F2-268E20185316}"/>
+              </a:ext>
+            </a:extLst>
+          </p:cNvPr>
+          <p:cNvSpPr txBox="1"/>
+          <p:nvPr/>
+        </p:nvSpPr>
+        <p:spPr>
+          <a:xfrm>
+            <a:off x="266002" y="5185049"/>
+            <a:ext cx="1331638" cy="261610"/>
+          </a:xfrm>
+          <a:prstGeom prst="rect">
+            <a:avLst/>
+          </a:prstGeom>
+          <a:solidFill>
+            <a:schemeClr val="bg1"/>
+          </a:solidFill>
+          <a:effectLst>
+            <a:outerShdw blurRad="63500" sx="102000" sy="102000" algn="ctr" rotWithShape="0">
+              <a:prstClr val="black">
+                <a:alpha val="40000"/>
+              </a:prstClr>
+            </a:outerShdw>
+          </a:effectLst>
+        </p:spPr>
+        <p:style>
+          <a:lnRef idx="3">
+            <a:schemeClr val="lt1"/>
+          </a:lnRef>
+          <a:fillRef idx="1">
+            <a:schemeClr val="dk1"/>
+          </a:fillRef>
+          <a:effectRef idx="1">
+            <a:schemeClr val="dk1"/>
+          </a:effectRef>
+          <a:fontRef idx="minor">
+            <a:schemeClr val="lt1"/>
+          </a:fontRef>
+        </p:style>
+        <p:txBody>
+          <a:bodyPr wrap="square" rtlCol="0">
+            <a:spAutoFit/>
+          </a:bodyPr>
+          <a:lstStyle/>
+          <a:p>
+            <a:pPr algn="ctr"/>
+            <a:r>
+              <a:rPr lang="en-US" altLang="ko-KR" sz="1050" b="1">
+                <a:ln w="3175">
+                  <a:solidFill>
+                    <a:schemeClr val="bg2">
+                      <a:lumMod val="50000"/>
+                    </a:schemeClr>
+                  </a:solidFill>
+                  <a:prstDash val="solid"/>
+                </a:ln>
+                <a:solidFill>
+                  <a:schemeClr val="tx1">
+                    <a:lumMod val="95000"/>
+                    <a:lumOff val="5000"/>
+                  </a:schemeClr>
+                </a:solidFill>
+                <a:latin typeface="Footlight MT Light" panose="0204060206030A020304" pitchFamily="18" charset="0"/>
+                <a:ea typeface="DengXian" panose="020B0503020204020204" pitchFamily="2" charset="-122"/>
+                <a:cs typeface="David" panose="020B0604020202020204" pitchFamily="34" charset="-79"/>
+              </a:rPr>
+              <a:t>keyword_data2.csv</a:t>
+            </a:r>
+            <a:endParaRPr lang="ko-KR" altLang="en-US" sz="1050" b="1">
+              <a:ln w="3175">
+                <a:solidFill>
+                  <a:schemeClr val="bg2">
+                    <a:lumMod val="50000"/>
+                  </a:schemeClr>
+                </a:solidFill>
+                <a:prstDash val="solid"/>
+              </a:ln>
+              <a:solidFill>
+                <a:schemeClr val="tx1">
+                  <a:lumMod val="95000"/>
+                  <a:lumOff val="5000"/>
+                </a:schemeClr>
+              </a:solidFill>
+              <a:latin typeface="Footlight MT Light" panose="0204060206030A020304" pitchFamily="18" charset="0"/>
+              <a:cs typeface="David" panose="020B0604020202020204" pitchFamily="34" charset="-79"/>
+            </a:endParaRPr>
+          </a:p>
+        </p:txBody>
+      </p:sp>
+      <p:sp>
+        <p:nvSpPr>
+          <p:cNvPr id="29" name="TextBox 28">
+            <a:extLst>
+              <a:ext uri="{FF2B5EF4-FFF2-40B4-BE49-F238E27FC236}">
+                <a16:creationId xmlns:a16="http://schemas.microsoft.com/office/drawing/2014/main" id="{20519E38-1EFE-4E04-9DBD-0F8EAE05B123}"/>
+              </a:ext>
+            </a:extLst>
+          </p:cNvPr>
+          <p:cNvSpPr txBox="1"/>
+          <p:nvPr/>
+        </p:nvSpPr>
+        <p:spPr>
+          <a:xfrm>
+            <a:off x="266002" y="5845346"/>
+            <a:ext cx="1331638" cy="261610"/>
+          </a:xfrm>
+          <a:prstGeom prst="rect">
+            <a:avLst/>
+          </a:prstGeom>
+          <a:solidFill>
+            <a:schemeClr val="bg1"/>
+          </a:solidFill>
+          <a:effectLst>
+            <a:outerShdw blurRad="63500" sx="102000" sy="102000" algn="ctr" rotWithShape="0">
+              <a:prstClr val="black">
+                <a:alpha val="40000"/>
+              </a:prstClr>
+            </a:outerShdw>
+          </a:effectLst>
+        </p:spPr>
+        <p:style>
+          <a:lnRef idx="3">
+            <a:schemeClr val="lt1"/>
+          </a:lnRef>
+          <a:fillRef idx="1">
+            <a:schemeClr val="dk1"/>
+          </a:fillRef>
+          <a:effectRef idx="1">
+            <a:schemeClr val="dk1"/>
+          </a:effectRef>
+          <a:fontRef idx="minor">
+            <a:schemeClr val="lt1"/>
+          </a:fontRef>
+        </p:style>
+        <p:txBody>
+          <a:bodyPr wrap="square" rtlCol="0">
+            <a:spAutoFit/>
+          </a:bodyPr>
+          <a:lstStyle/>
+          <a:p>
+            <a:pPr algn="ctr"/>
+            <a:r>
+              <a:rPr lang="en-US" altLang="ko-KR" sz="1050" b="1">
+                <a:ln w="3175">
+                  <a:solidFill>
+                    <a:schemeClr val="bg2">
+                      <a:lumMod val="50000"/>
+                    </a:schemeClr>
+                  </a:solidFill>
+                  <a:prstDash val="solid"/>
+                </a:ln>
+                <a:solidFill>
+                  <a:schemeClr val="tx1">
+                    <a:lumMod val="95000"/>
+                    <a:lumOff val="5000"/>
+                  </a:schemeClr>
+                </a:solidFill>
+                <a:latin typeface="Footlight MT Light" panose="0204060206030A020304" pitchFamily="18" charset="0"/>
+                <a:ea typeface="DengXian" panose="020B0503020204020204" pitchFamily="2" charset="-122"/>
+                <a:cs typeface="David" panose="020B0604020202020204" pitchFamily="34" charset="-79"/>
+              </a:rPr>
+              <a:t>keyword_data3.csv</a:t>
+            </a:r>
+            <a:endParaRPr lang="ko-KR" altLang="en-US" sz="1050" b="1">
+              <a:ln w="3175">
+                <a:solidFill>
+                  <a:schemeClr val="bg2">
+                    <a:lumMod val="50000"/>
+                  </a:schemeClr>
+                </a:solidFill>
+                <a:prstDash val="solid"/>
+              </a:ln>
+              <a:solidFill>
+                <a:schemeClr val="tx1">
+                  <a:lumMod val="95000"/>
+                  <a:lumOff val="5000"/>
+                </a:schemeClr>
+              </a:solidFill>
+              <a:latin typeface="Footlight MT Light" panose="0204060206030A020304" pitchFamily="18" charset="0"/>
+              <a:cs typeface="David" panose="020B0604020202020204" pitchFamily="34" charset="-79"/>
+            </a:endParaRPr>
+          </a:p>
+        </p:txBody>
+      </p:sp>
+      <p:cxnSp>
+        <p:nvCxnSpPr>
+          <p:cNvPr id="30" name="직선 화살표 연결선 29">
+            <a:extLst>
+              <a:ext uri="{FF2B5EF4-FFF2-40B4-BE49-F238E27FC236}">
+                <a16:creationId xmlns:a16="http://schemas.microsoft.com/office/drawing/2014/main" id="{8FC57E15-8EC9-4285-B26E-6056A7921728}"/>
+              </a:ext>
+            </a:extLst>
+          </p:cNvPr>
+          <p:cNvCxnSpPr>
+            <a:cxnSpLocks/>
+            <a:stCxn id="29" idx="3"/>
+            <a:endCxn id="10" idx="1"/>
+          </p:cNvCxnSpPr>
+          <p:nvPr/>
+        </p:nvCxnSpPr>
+        <p:spPr>
+          <a:xfrm flipV="1">
+            <a:off x="1597640" y="5338938"/>
+            <a:ext cx="1077683" cy="637213"/>
+          </a:xfrm>
+          <a:prstGeom prst="straightConnector1">
+            <a:avLst/>
+          </a:prstGeom>
+          <a:ln w="57150">
+            <a:solidFill>
+              <a:schemeClr val="accent6"/>
+            </a:solidFill>
+            <a:headEnd type="none" w="med" len="med"/>
+            <a:tailEnd type="none" w="med" len="med"/>
+          </a:ln>
+        </p:spPr>
+        <p:style>
+          <a:lnRef idx="1">
+            <a:schemeClr val="dk1"/>
+          </a:lnRef>
+          <a:fillRef idx="0">
+            <a:schemeClr val="dk1"/>
+          </a:fillRef>
+          <a:effectRef idx="0">
+            <a:schemeClr val="dk1"/>
+          </a:effectRef>
+          <a:fontRef idx="minor">
+            <a:schemeClr val="tx1"/>
+          </a:fontRef>
+        </p:style>
+      </p:cxnSp>
+      <p:cxnSp>
+        <p:nvCxnSpPr>
+          <p:cNvPr id="33" name="직선 화살표 연결선 32">
+            <a:extLst>
+              <a:ext uri="{FF2B5EF4-FFF2-40B4-BE49-F238E27FC236}">
+                <a16:creationId xmlns:a16="http://schemas.microsoft.com/office/drawing/2014/main" id="{4880CEFC-6501-405D-BD60-1C57A1A86168}"/>
+              </a:ext>
+            </a:extLst>
+          </p:cNvPr>
+          <p:cNvCxnSpPr>
+            <a:cxnSpLocks/>
+            <a:stCxn id="28" idx="3"/>
+            <a:endCxn id="10" idx="1"/>
+          </p:cNvCxnSpPr>
+          <p:nvPr/>
+        </p:nvCxnSpPr>
+        <p:spPr>
+          <a:xfrm>
+            <a:off x="1597640" y="5315854"/>
+            <a:ext cx="1077683" cy="23084"/>
+          </a:xfrm>
+          <a:prstGeom prst="straightConnector1">
+            <a:avLst/>
+          </a:prstGeom>
+          <a:ln w="57150">
+            <a:solidFill>
+              <a:schemeClr val="accent6"/>
+            </a:solidFill>
+            <a:headEnd type="none" w="med" len="med"/>
+            <a:tailEnd type="none" w="med" len="med"/>
+          </a:ln>
+        </p:spPr>
+        <p:style>
+          <a:lnRef idx="1">
+            <a:schemeClr val="dk1"/>
+          </a:lnRef>
+          <a:fillRef idx="0">
+            <a:schemeClr val="dk1"/>
+          </a:fillRef>
+          <a:effectRef idx="0">
+            <a:schemeClr val="dk1"/>
+          </a:effectRef>
+          <a:fontRef idx="minor">
+            <a:schemeClr val="tx1"/>
+          </a:fontRef>
+        </p:style>
+      </p:cxnSp>
+      <p:grpSp>
+        <p:nvGrpSpPr>
+          <p:cNvPr id="43" name="그룹 42">
+            <a:extLst>
+              <a:ext uri="{FF2B5EF4-FFF2-40B4-BE49-F238E27FC236}">
+                <a16:creationId xmlns:a16="http://schemas.microsoft.com/office/drawing/2014/main" id="{EA6C7701-C4FD-4F6D-9CC5-993EC98980F7}"/>
+              </a:ext>
+            </a:extLst>
+          </p:cNvPr>
+          <p:cNvGrpSpPr/>
+          <p:nvPr/>
+        </p:nvGrpSpPr>
+        <p:grpSpPr>
+          <a:xfrm>
+            <a:off x="8708994" y="1892992"/>
+            <a:ext cx="2927570" cy="1244379"/>
+            <a:chOff x="8685959" y="1892992"/>
+            <a:chExt cx="2969962" cy="1244379"/>
+          </a:xfrm>
+        </p:grpSpPr>
+        <p:pic>
+          <p:nvPicPr>
+            <p:cNvPr id="42" name="Picture 8" descr="구글 인기 검색어 순위 공개, 분류별 인기 검색 키워드 탑 10">
+              <a:extLst>
+                <a:ext uri="{FF2B5EF4-FFF2-40B4-BE49-F238E27FC236}">
+                  <a16:creationId xmlns:a16="http://schemas.microsoft.com/office/drawing/2014/main" id="{C13C1231-BE10-4CCD-81BF-28F36CE08F5A}"/>
+                </a:ext>
+              </a:extLst>
+            </p:cNvPr>
+            <p:cNvPicPr>
+              <a:picLocks noChangeAspect="1" noChangeArrowheads="1"/>
+            </p:cNvPicPr>
+            <p:nvPr/>
+          </p:nvPicPr>
+          <p:blipFill rotWithShape="1">
+            <a:blip r:embed="rId6">
+              <a:extLst>
+                <a:ext uri="{28A0092B-C50C-407E-A947-70E740481C1C}">
+                  <a14:useLocalDpi xmlns:a14="http://schemas.microsoft.com/office/drawing/2010/main" val="0"/>
+                </a:ext>
+              </a:extLst>
+            </a:blip>
+            <a:srcRect t="3834" b="35086"/>
+            <a:stretch/>
+          </p:blipFill>
+          <p:spPr bwMode="auto">
+            <a:xfrm>
+              <a:off x="8685959" y="1892992"/>
+              <a:ext cx="2129056" cy="1244379"/>
+            </a:xfrm>
+            <a:prstGeom prst="rect">
+              <a:avLst/>
+            </a:prstGeom>
+            <a:noFill/>
+            <a:extLst>
+              <a:ext uri="{909E8E84-426E-40DD-AFC4-6F175D3DCCD1}">
+                <a14:hiddenFill xmlns:a14="http://schemas.microsoft.com/office/drawing/2010/main">
+                  <a:solidFill>
+                    <a:srgbClr val="FFFFFF"/>
+                  </a:solidFill>
+                </a14:hiddenFill>
+              </a:ext>
+            </a:extLst>
+          </p:spPr>
+        </p:pic>
+        <p:pic>
+          <p:nvPicPr>
+            <p:cNvPr id="49" name="Picture 8" descr="구글 인기 검색어 순위 공개, 분류별 인기 검색 키워드 탑 10">
+              <a:extLst>
+                <a:ext uri="{FF2B5EF4-FFF2-40B4-BE49-F238E27FC236}">
+                  <a16:creationId xmlns:a16="http://schemas.microsoft.com/office/drawing/2014/main" id="{CDD01B19-35E0-4848-B04D-44E94A18EAF9}"/>
+                </a:ext>
+              </a:extLst>
+            </p:cNvPr>
+            <p:cNvPicPr>
+              <a:picLocks noChangeAspect="1" noChangeArrowheads="1"/>
+            </p:cNvPicPr>
+            <p:nvPr/>
+          </p:nvPicPr>
+          <p:blipFill rotWithShape="1">
+            <a:blip r:embed="rId6">
+              <a:extLst>
+                <a:ext uri="{28A0092B-C50C-407E-A947-70E740481C1C}">
+                  <a14:useLocalDpi xmlns:a14="http://schemas.microsoft.com/office/drawing/2010/main" val="0"/>
+                </a:ext>
+              </a:extLst>
+            </a:blip>
+            <a:srcRect l="50633" t="3834" b="35086"/>
+            <a:stretch/>
+          </p:blipFill>
+          <p:spPr bwMode="auto">
+            <a:xfrm>
+              <a:off x="10604863" y="1892992"/>
+              <a:ext cx="1051058" cy="1244379"/>
+            </a:xfrm>
+            <a:prstGeom prst="rect">
+              <a:avLst/>
+            </a:prstGeom>
+            <a:noFill/>
+            <a:extLst>
+              <a:ext uri="{909E8E84-426E-40DD-AFC4-6F175D3DCCD1}">
+                <a14:hiddenFill xmlns:a14="http://schemas.microsoft.com/office/drawing/2010/main">
+                  <a:solidFill>
+                    <a:srgbClr val="FFFFFF"/>
+                  </a:solidFill>
+                </a14:hiddenFill>
+              </a:ext>
+            </a:extLst>
+          </p:spPr>
+        </p:pic>
+      </p:grpSp>
+      <p:sp>
+        <p:nvSpPr>
+          <p:cNvPr id="51" name="TextBox 50">
+            <a:extLst>
+              <a:ext uri="{FF2B5EF4-FFF2-40B4-BE49-F238E27FC236}">
+                <a16:creationId xmlns:a16="http://schemas.microsoft.com/office/drawing/2014/main" id="{00E63C2B-9C36-4FEA-99C2-77AB1AB5F1E6}"/>
+              </a:ext>
+            </a:extLst>
+          </p:cNvPr>
+          <p:cNvSpPr txBox="1"/>
+          <p:nvPr/>
+        </p:nvSpPr>
+        <p:spPr>
+          <a:xfrm>
+            <a:off x="8507767" y="5185049"/>
+            <a:ext cx="3255146" cy="307777"/>
+          </a:xfrm>
+          <a:prstGeom prst="rect">
+            <a:avLst/>
+          </a:prstGeom>
+          <a:solidFill>
+            <a:schemeClr val="bg1"/>
+          </a:solidFill>
+          <a:effectLst>
+            <a:outerShdw blurRad="63500" sx="102000" sy="102000" algn="ctr" rotWithShape="0">
+              <a:prstClr val="black">
+                <a:alpha val="40000"/>
+              </a:prstClr>
+            </a:outerShdw>
+          </a:effectLst>
+        </p:spPr>
+        <p:style>
+          <a:lnRef idx="3">
+            <a:schemeClr val="lt1"/>
+          </a:lnRef>
+          <a:fillRef idx="1">
+            <a:schemeClr val="dk1"/>
+          </a:fillRef>
+          <a:effectRef idx="1">
+            <a:schemeClr val="dk1"/>
+          </a:effectRef>
+          <a:fontRef idx="minor">
+            <a:schemeClr val="lt1"/>
+          </a:fontRef>
+        </p:style>
+        <p:txBody>
+          <a:bodyPr wrap="square" rtlCol="0">
+            <a:spAutoFit/>
+          </a:bodyPr>
+          <a:lstStyle/>
+          <a:p>
+            <a:pPr algn="ctr"/>
+            <a:r>
+              <a:rPr lang="en-US" altLang="ko-KR" sz="1400" b="1">
+                <a:ln w="3175">
+                  <a:solidFill>
+                    <a:schemeClr val="bg2">
+                      <a:lumMod val="50000"/>
+                    </a:schemeClr>
+                  </a:solidFill>
+                  <a:prstDash val="solid"/>
+                </a:ln>
+                <a:solidFill>
+                  <a:schemeClr val="tx1">
+                    <a:lumMod val="95000"/>
+                    <a:lumOff val="5000"/>
+                  </a:schemeClr>
+                </a:solidFill>
+                <a:latin typeface="Footlight MT Light" panose="0204060206030A020304" pitchFamily="18" charset="0"/>
+                <a:cs typeface="David" panose="020B0604020202020204" pitchFamily="34" charset="-79"/>
+              </a:rPr>
+              <a:t>server</a:t>
+            </a:r>
+            <a:endParaRPr lang="ko-KR" altLang="en-US" sz="1400" b="1">
+              <a:ln w="3175">
+                <a:solidFill>
+                  <a:schemeClr val="bg2">
+                    <a:lumMod val="50000"/>
+                  </a:schemeClr>
+                </a:solidFill>
+                <a:prstDash val="solid"/>
+              </a:ln>
+              <a:solidFill>
+                <a:schemeClr val="tx1">
+                  <a:lumMod val="95000"/>
+                  <a:lumOff val="5000"/>
+                </a:schemeClr>
+              </a:solidFill>
+              <a:latin typeface="Footlight MT Light" panose="0204060206030A020304" pitchFamily="18" charset="0"/>
+              <a:cs typeface="David" panose="020B0604020202020204" pitchFamily="34" charset="-79"/>
+            </a:endParaRPr>
+          </a:p>
+        </p:txBody>
+      </p:sp>
     </p:spTree>
     <p:extLst>
       <p:ext uri="{BB962C8B-B14F-4D97-AF65-F5344CB8AC3E}">

</xml_diff>